<commit_message>
Updated Power Point File
Updated Power Point File
</commit_message>
<xml_diff>
--- a/Template_FolderStructure.pptx
+++ b/Template_FolderStructure.pptx
@@ -116,6 +116,7 @@
 <p1510:revInfo xmlns:a="http://schemas.openxmlformats.org/drawingml/2006/main" xmlns:r="http://schemas.openxmlformats.org/officeDocument/2006/relationships" xmlns:p1510="http://schemas.microsoft.com/office/powerpoint/2015/10/main">
   <p1510:revLst>
     <p1510:client id="{2EB49868-193A-461D-8BAB-7999B85BB3F2}" v="75" dt="2024-10-01T22:18:53.204"/>
+    <p1510:client id="{CA410331-05AC-4FED-9F19-912EABEC3A9F}" v="11" dt="2024-10-02T07:41:17.626"/>
   </p1510:revLst>
 </p1510:revInfo>
 </file>
@@ -1437,6 +1438,158 @@
             <pc:docMk/>
             <pc:sldMk cId="3552304235" sldId="256"/>
             <ac:cxnSpMk id="151" creationId="{A8CFEAF3-C33B-9BBA-4481-37AA8F35ADA4}"/>
+          </ac:cxnSpMkLst>
+        </pc:cxnChg>
+      </pc:sldChg>
+    </pc:docChg>
+  </pc:docChgLst>
+  <pc:docChgLst>
+    <pc:chgData name="Marcukov, Vitalij" userId="df1d1437-63bd-4bfa-a4ad-5a143d193296" providerId="ADAL" clId="{CA410331-05AC-4FED-9F19-912EABEC3A9F}"/>
+    <pc:docChg chg="undo custSel modSld">
+      <pc:chgData name="Marcukov, Vitalij" userId="df1d1437-63bd-4bfa-a4ad-5a143d193296" providerId="ADAL" clId="{CA410331-05AC-4FED-9F19-912EABEC3A9F}" dt="2024-10-02T07:46:08.248" v="621" actId="14100"/>
+      <pc:docMkLst>
+        <pc:docMk/>
+      </pc:docMkLst>
+      <pc:sldChg chg="addSp delSp modSp mod">
+        <pc:chgData name="Marcukov, Vitalij" userId="df1d1437-63bd-4bfa-a4ad-5a143d193296" providerId="ADAL" clId="{CA410331-05AC-4FED-9F19-912EABEC3A9F}" dt="2024-10-02T07:46:08.248" v="621" actId="14100"/>
+        <pc:sldMkLst>
+          <pc:docMk/>
+          <pc:sldMk cId="3552304235" sldId="256"/>
+        </pc:sldMkLst>
+        <pc:spChg chg="add del mod">
+          <ac:chgData name="Marcukov, Vitalij" userId="df1d1437-63bd-4bfa-a4ad-5a143d193296" providerId="ADAL" clId="{CA410331-05AC-4FED-9F19-912EABEC3A9F}" dt="2024-10-02T07:42:20.534" v="610" actId="478"/>
+          <ac:spMkLst>
+            <pc:docMk/>
+            <pc:sldMk cId="3552304235" sldId="256"/>
+            <ac:spMk id="2" creationId="{5782D623-BADF-96C1-9E5D-08790C3677AE}"/>
+          </ac:spMkLst>
+        </pc:spChg>
+        <pc:spChg chg="mod">
+          <ac:chgData name="Marcukov, Vitalij" userId="df1d1437-63bd-4bfa-a4ad-5a143d193296" providerId="ADAL" clId="{CA410331-05AC-4FED-9F19-912EABEC3A9F}" dt="2024-10-02T07:32:24.839" v="206" actId="255"/>
+          <ac:spMkLst>
+            <pc:docMk/>
+            <pc:sldMk cId="3552304235" sldId="256"/>
+            <ac:spMk id="7" creationId="{1DFCA376-5AA7-4879-2EB3-6546DD0066DF}"/>
+          </ac:spMkLst>
+        </pc:spChg>
+        <pc:spChg chg="add del mod">
+          <ac:chgData name="Marcukov, Vitalij" userId="df1d1437-63bd-4bfa-a4ad-5a143d193296" providerId="ADAL" clId="{CA410331-05AC-4FED-9F19-912EABEC3A9F}" dt="2024-10-02T07:42:18.322" v="609" actId="478"/>
+          <ac:spMkLst>
+            <pc:docMk/>
+            <pc:sldMk cId="3552304235" sldId="256"/>
+            <ac:spMk id="8" creationId="{D1E1FEB1-84F2-7C95-704A-9C06D002D348}"/>
+          </ac:spMkLst>
+        </pc:spChg>
+        <pc:spChg chg="add del mod">
+          <ac:chgData name="Marcukov, Vitalij" userId="df1d1437-63bd-4bfa-a4ad-5a143d193296" providerId="ADAL" clId="{CA410331-05AC-4FED-9F19-912EABEC3A9F}" dt="2024-10-02T07:32:45.046" v="213" actId="478"/>
+          <ac:spMkLst>
+            <pc:docMk/>
+            <pc:sldMk cId="3552304235" sldId="256"/>
+            <ac:spMk id="10" creationId="{71509536-2B02-E6D3-30A6-7177A7DD2243}"/>
+          </ac:spMkLst>
+        </pc:spChg>
+        <pc:spChg chg="add del mod">
+          <ac:chgData name="Marcukov, Vitalij" userId="df1d1437-63bd-4bfa-a4ad-5a143d193296" providerId="ADAL" clId="{CA410331-05AC-4FED-9F19-912EABEC3A9F}" dt="2024-10-02T07:32:48.147" v="214" actId="478"/>
+          <ac:spMkLst>
+            <pc:docMk/>
+            <pc:sldMk cId="3552304235" sldId="256"/>
+            <ac:spMk id="58" creationId="{7ADA6C6C-99E2-822C-2730-519A961E1605}"/>
+          </ac:spMkLst>
+        </pc:spChg>
+        <pc:spChg chg="add del mod">
+          <ac:chgData name="Marcukov, Vitalij" userId="df1d1437-63bd-4bfa-a4ad-5a143d193296" providerId="ADAL" clId="{CA410331-05AC-4FED-9F19-912EABEC3A9F}" dt="2024-10-02T07:32:31.824" v="208" actId="478"/>
+          <ac:spMkLst>
+            <pc:docMk/>
+            <pc:sldMk cId="3552304235" sldId="256"/>
+            <ac:spMk id="62" creationId="{79492C04-0832-E62E-1FC1-75A07624068D}"/>
+          </ac:spMkLst>
+        </pc:spChg>
+        <pc:spChg chg="add del mod">
+          <ac:chgData name="Marcukov, Vitalij" userId="df1d1437-63bd-4bfa-a4ad-5a143d193296" providerId="ADAL" clId="{CA410331-05AC-4FED-9F19-912EABEC3A9F}" dt="2024-10-02T07:32:16.855" v="205" actId="478"/>
+          <ac:spMkLst>
+            <pc:docMk/>
+            <pc:sldMk cId="3552304235" sldId="256"/>
+            <ac:spMk id="65" creationId="{D9D7BD83-CE84-C965-6239-ED09954E7C63}"/>
+          </ac:spMkLst>
+        </pc:spChg>
+        <pc:spChg chg="add del mod">
+          <ac:chgData name="Marcukov, Vitalij" userId="df1d1437-63bd-4bfa-a4ad-5a143d193296" providerId="ADAL" clId="{CA410331-05AC-4FED-9F19-912EABEC3A9F}" dt="2024-10-02T07:32:10.657" v="202" actId="478"/>
+          <ac:spMkLst>
+            <pc:docMk/>
+            <pc:sldMk cId="3552304235" sldId="256"/>
+            <ac:spMk id="66" creationId="{AD4B3642-0D2A-8E52-4E0A-3D70DC87616E}"/>
+          </ac:spMkLst>
+        </pc:spChg>
+        <pc:spChg chg="add mod">
+          <ac:chgData name="Marcukov, Vitalij" userId="df1d1437-63bd-4bfa-a4ad-5a143d193296" providerId="ADAL" clId="{CA410331-05AC-4FED-9F19-912EABEC3A9F}" dt="2024-10-02T07:38:32.775" v="437" actId="1076"/>
+          <ac:spMkLst>
+            <pc:docMk/>
+            <pc:sldMk cId="3552304235" sldId="256"/>
+            <ac:spMk id="69" creationId="{ED0DCF5F-BAF0-EF02-027A-0CEA59ABC720}"/>
+          </ac:spMkLst>
+        </pc:spChg>
+        <pc:spChg chg="add mod">
+          <ac:chgData name="Marcukov, Vitalij" userId="df1d1437-63bd-4bfa-a4ad-5a143d193296" providerId="ADAL" clId="{CA410331-05AC-4FED-9F19-912EABEC3A9F}" dt="2024-10-02T07:40:41.009" v="534" actId="20577"/>
+          <ac:spMkLst>
+            <pc:docMk/>
+            <pc:sldMk cId="3552304235" sldId="256"/>
+            <ac:spMk id="70" creationId="{FE586D09-15DD-F0C7-83AE-F2132529DCA8}"/>
+          </ac:spMkLst>
+        </pc:spChg>
+        <pc:spChg chg="add mod">
+          <ac:chgData name="Marcukov, Vitalij" userId="df1d1437-63bd-4bfa-a4ad-5a143d193296" providerId="ADAL" clId="{CA410331-05AC-4FED-9F19-912EABEC3A9F}" dt="2024-10-02T07:40:57.752" v="553" actId="20577"/>
+          <ac:spMkLst>
+            <pc:docMk/>
+            <pc:sldMk cId="3552304235" sldId="256"/>
+            <ac:spMk id="71" creationId="{57519985-0AA0-210A-B3AA-998A07387C91}"/>
+          </ac:spMkLst>
+        </pc:spChg>
+        <pc:spChg chg="add mod">
+          <ac:chgData name="Marcukov, Vitalij" userId="df1d1437-63bd-4bfa-a4ad-5a143d193296" providerId="ADAL" clId="{CA410331-05AC-4FED-9F19-912EABEC3A9F}" dt="2024-10-02T07:46:08.248" v="621" actId="14100"/>
+          <ac:spMkLst>
+            <pc:docMk/>
+            <pc:sldMk cId="3552304235" sldId="256"/>
+            <ac:spMk id="72" creationId="{C1FEF020-107E-3549-E2DD-BE15EFED0F89}"/>
+          </ac:spMkLst>
+        </pc:spChg>
+        <pc:spChg chg="mod">
+          <ac:chgData name="Marcukov, Vitalij" userId="df1d1437-63bd-4bfa-a4ad-5a143d193296" providerId="ADAL" clId="{CA410331-05AC-4FED-9F19-912EABEC3A9F}" dt="2024-10-02T07:42:42.037" v="614" actId="113"/>
+          <ac:spMkLst>
+            <pc:docMk/>
+            <pc:sldMk cId="3552304235" sldId="256"/>
+            <ac:spMk id="116" creationId="{919D81DE-96E1-90FD-A39F-A9497A52985F}"/>
+          </ac:spMkLst>
+        </pc:spChg>
+        <pc:picChg chg="add del mod">
+          <ac:chgData name="Marcukov, Vitalij" userId="df1d1437-63bd-4bfa-a4ad-5a143d193296" providerId="ADAL" clId="{CA410331-05AC-4FED-9F19-912EABEC3A9F}" dt="2024-10-02T07:32:40.861" v="211" actId="478"/>
+          <ac:picMkLst>
+            <pc:docMk/>
+            <pc:sldMk cId="3552304235" sldId="256"/>
+            <ac:picMk id="9" creationId="{DB6F42D1-B256-49A9-2B45-19CB62F7E33F}"/>
+          </ac:picMkLst>
+        </pc:picChg>
+        <pc:picChg chg="add del mod">
+          <ac:chgData name="Marcukov, Vitalij" userId="df1d1437-63bd-4bfa-a4ad-5a143d193296" providerId="ADAL" clId="{CA410331-05AC-4FED-9F19-912EABEC3A9F}" dt="2024-10-02T07:32:12.289" v="203" actId="478"/>
+          <ac:picMkLst>
+            <pc:docMk/>
+            <pc:sldMk cId="3552304235" sldId="256"/>
+            <ac:picMk id="63" creationId="{E8865709-1E9F-BC07-DFF2-AD5146294F95}"/>
+          </ac:picMkLst>
+        </pc:picChg>
+        <pc:cxnChg chg="mod">
+          <ac:chgData name="Marcukov, Vitalij" userId="df1d1437-63bd-4bfa-a4ad-5a143d193296" providerId="ADAL" clId="{CA410331-05AC-4FED-9F19-912EABEC3A9F}" dt="2024-10-02T07:32:37.190" v="209" actId="14100"/>
+          <ac:cxnSpMkLst>
+            <pc:docMk/>
+            <pc:sldMk cId="3552304235" sldId="256"/>
+            <ac:cxnSpMk id="54" creationId="{370DD28F-1238-E180-1BB7-6CFA41B7246D}"/>
+          </ac:cxnSpMkLst>
+        </pc:cxnChg>
+        <pc:cxnChg chg="add del mod">
+          <ac:chgData name="Marcukov, Vitalij" userId="df1d1437-63bd-4bfa-a4ad-5a143d193296" providerId="ADAL" clId="{CA410331-05AC-4FED-9F19-912EABEC3A9F}" dt="2024-10-02T07:32:39.243" v="210" actId="478"/>
+          <ac:cxnSpMkLst>
+            <pc:docMk/>
+            <pc:sldMk cId="3552304235" sldId="256"/>
+            <ac:cxnSpMk id="55" creationId="{22FB847C-35C9-BB8D-D019-1A761377CD66}"/>
           </ac:cxnSpMkLst>
         </pc:cxnChg>
       </pc:sldChg>
@@ -1594,7 +1747,7 @@
           <a:p>
             <a:fld id="{FF7878C8-556D-4887-9E23-AB74B4DFF276}" type="datetimeFigureOut">
               <a:rPr lang="en-GB" smtClean="0"/>
-              <a:t>01/10/2024</a:t>
+              <a:t>02/10/2024</a:t>
             </a:fld>
             <a:endParaRPr lang="en-GB"/>
           </a:p>
@@ -1794,7 +1947,7 @@
           <a:p>
             <a:fld id="{FF7878C8-556D-4887-9E23-AB74B4DFF276}" type="datetimeFigureOut">
               <a:rPr lang="en-GB" smtClean="0"/>
-              <a:t>01/10/2024</a:t>
+              <a:t>02/10/2024</a:t>
             </a:fld>
             <a:endParaRPr lang="en-GB"/>
           </a:p>
@@ -2004,7 +2157,7 @@
           <a:p>
             <a:fld id="{FF7878C8-556D-4887-9E23-AB74B4DFF276}" type="datetimeFigureOut">
               <a:rPr lang="en-GB" smtClean="0"/>
-              <a:t>01/10/2024</a:t>
+              <a:t>02/10/2024</a:t>
             </a:fld>
             <a:endParaRPr lang="en-GB"/>
           </a:p>
@@ -2204,7 +2357,7 @@
           <a:p>
             <a:fld id="{FF7878C8-556D-4887-9E23-AB74B4DFF276}" type="datetimeFigureOut">
               <a:rPr lang="en-GB" smtClean="0"/>
-              <a:t>01/10/2024</a:t>
+              <a:t>02/10/2024</a:t>
             </a:fld>
             <a:endParaRPr lang="en-GB"/>
           </a:p>
@@ -2480,7 +2633,7 @@
           <a:p>
             <a:fld id="{FF7878C8-556D-4887-9E23-AB74B4DFF276}" type="datetimeFigureOut">
               <a:rPr lang="en-GB" smtClean="0"/>
-              <a:t>01/10/2024</a:t>
+              <a:t>02/10/2024</a:t>
             </a:fld>
             <a:endParaRPr lang="en-GB"/>
           </a:p>
@@ -2748,7 +2901,7 @@
           <a:p>
             <a:fld id="{FF7878C8-556D-4887-9E23-AB74B4DFF276}" type="datetimeFigureOut">
               <a:rPr lang="en-GB" smtClean="0"/>
-              <a:t>01/10/2024</a:t>
+              <a:t>02/10/2024</a:t>
             </a:fld>
             <a:endParaRPr lang="en-GB"/>
           </a:p>
@@ -3163,7 +3316,7 @@
           <a:p>
             <a:fld id="{FF7878C8-556D-4887-9E23-AB74B4DFF276}" type="datetimeFigureOut">
               <a:rPr lang="en-GB" smtClean="0"/>
-              <a:t>01/10/2024</a:t>
+              <a:t>02/10/2024</a:t>
             </a:fld>
             <a:endParaRPr lang="en-GB"/>
           </a:p>
@@ -3305,7 +3458,7 @@
           <a:p>
             <a:fld id="{FF7878C8-556D-4887-9E23-AB74B4DFF276}" type="datetimeFigureOut">
               <a:rPr lang="en-GB" smtClean="0"/>
-              <a:t>01/10/2024</a:t>
+              <a:t>02/10/2024</a:t>
             </a:fld>
             <a:endParaRPr lang="en-GB"/>
           </a:p>
@@ -3418,7 +3571,7 @@
           <a:p>
             <a:fld id="{FF7878C8-556D-4887-9E23-AB74B4DFF276}" type="datetimeFigureOut">
               <a:rPr lang="en-GB" smtClean="0"/>
-              <a:t>01/10/2024</a:t>
+              <a:t>02/10/2024</a:t>
             </a:fld>
             <a:endParaRPr lang="en-GB"/>
           </a:p>
@@ -3731,7 +3884,7 @@
           <a:p>
             <a:fld id="{FF7878C8-556D-4887-9E23-AB74B4DFF276}" type="datetimeFigureOut">
               <a:rPr lang="en-GB" smtClean="0"/>
-              <a:t>01/10/2024</a:t>
+              <a:t>02/10/2024</a:t>
             </a:fld>
             <a:endParaRPr lang="en-GB"/>
           </a:p>
@@ -4020,7 +4173,7 @@
           <a:p>
             <a:fld id="{FF7878C8-556D-4887-9E23-AB74B4DFF276}" type="datetimeFigureOut">
               <a:rPr lang="en-GB" smtClean="0"/>
-              <a:t>01/10/2024</a:t>
+              <a:t>02/10/2024</a:t>
             </a:fld>
             <a:endParaRPr lang="en-GB"/>
           </a:p>
@@ -4263,7 +4416,7 @@
           <a:p>
             <a:fld id="{FF7878C8-556D-4887-9E23-AB74B4DFF276}" type="datetimeFigureOut">
               <a:rPr lang="en-GB" smtClean="0"/>
-              <a:t>01/10/2024</a:t>
+              <a:t>02/10/2024</a:t>
             </a:fld>
             <a:endParaRPr lang="en-GB"/>
           </a:p>
@@ -7372,8 +7525,8 @@
         </p:nvCxnSpPr>
         <p:spPr>
           <a:xfrm flipV="1">
-            <a:off x="2581750" y="2397060"/>
-            <a:ext cx="3646019" cy="27285"/>
+            <a:off x="2581750" y="2392018"/>
+            <a:ext cx="3629568" cy="32327"/>
           </a:xfrm>
           <a:prstGeom prst="line">
             <a:avLst/>
@@ -7911,8 +8064,8 @@
         </p:nvSpPr>
         <p:spPr>
           <a:xfrm>
-            <a:off x="3681110" y="-18010"/>
-            <a:ext cx="1506657" cy="276999"/>
+            <a:off x="3124850" y="-18010"/>
+            <a:ext cx="2911324" cy="276999"/>
           </a:xfrm>
           <a:prstGeom prst="rect">
             <a:avLst/>
@@ -7927,7 +8080,11 @@
           <a:p>
             <a:r>
               <a:rPr lang="en-GB" sz="1200" b="1" dirty="0"/>
-              <a:t>FOLDER STRUCTURE</a:t>
+              <a:t>FOLDER STRUCTURE </a:t>
+            </a:r>
+            <a:r>
+              <a:rPr lang="en-GB" sz="1200" dirty="0"/>
+              <a:t>(possible options)</a:t>
             </a:r>
           </a:p>
         </p:txBody>
@@ -7975,6 +8132,182 @@
             <a:r>
               <a:rPr lang="en-GB" sz="1200" dirty="0"/>
               <a:t>-Master\extensions</a:t>
+            </a:r>
+          </a:p>
+        </p:txBody>
+      </p:sp>
+      <p:sp>
+        <p:nvSpPr>
+          <p:cNvPr id="69" name="TextBox 68">
+            <a:extLst>
+              <a:ext uri="{FF2B5EF4-FFF2-40B4-BE49-F238E27FC236}">
+                <a16:creationId xmlns:a16="http://schemas.microsoft.com/office/drawing/2014/main" id="{ED0DCF5F-BAF0-EF02-027A-0CEA59ABC720}"/>
+              </a:ext>
+            </a:extLst>
+          </p:cNvPr>
+          <p:cNvSpPr txBox="1"/>
+          <p:nvPr/>
+        </p:nvSpPr>
+        <p:spPr>
+          <a:xfrm>
+            <a:off x="4797690" y="1847902"/>
+            <a:ext cx="2091963" cy="246221"/>
+          </a:xfrm>
+          <a:prstGeom prst="rect">
+            <a:avLst/>
+          </a:prstGeom>
+          <a:noFill/>
+        </p:spPr>
+        <p:txBody>
+          <a:bodyPr wrap="square">
+            <a:spAutoFit/>
+          </a:bodyPr>
+          <a:lstStyle/>
+          <a:p>
+            <a:pPr algn="ctr"/>
+            <a:r>
+              <a:rPr lang="en-GB" sz="1000" b="1" dirty="0">
+                <a:solidFill>
+                  <a:srgbClr val="FF0000"/>
+                </a:solidFill>
+              </a:rPr>
+              <a:t>*</a:t>
+            </a:r>
+            <a:r>
+              <a:rPr lang="en-GB" sz="1000" dirty="0"/>
+              <a:t> more than one Tab can be created</a:t>
+            </a:r>
+          </a:p>
+        </p:txBody>
+      </p:sp>
+      <p:sp>
+        <p:nvSpPr>
+          <p:cNvPr id="70" name="TextBox 69">
+            <a:extLst>
+              <a:ext uri="{FF2B5EF4-FFF2-40B4-BE49-F238E27FC236}">
+                <a16:creationId xmlns:a16="http://schemas.microsoft.com/office/drawing/2014/main" id="{FE586D09-15DD-F0C7-83AE-F2132529DCA8}"/>
+              </a:ext>
+            </a:extLst>
+          </p:cNvPr>
+          <p:cNvSpPr txBox="1"/>
+          <p:nvPr/>
+        </p:nvSpPr>
+        <p:spPr>
+          <a:xfrm>
+            <a:off x="6594029" y="2661627"/>
+            <a:ext cx="1828187" cy="553998"/>
+          </a:xfrm>
+          <a:prstGeom prst="rect">
+            <a:avLst/>
+          </a:prstGeom>
+          <a:noFill/>
+        </p:spPr>
+        <p:txBody>
+          <a:bodyPr wrap="square">
+            <a:spAutoFit/>
+          </a:bodyPr>
+          <a:lstStyle/>
+          <a:p>
+            <a:pPr algn="ctr"/>
+            <a:r>
+              <a:rPr lang="en-GB" sz="1000" b="1" dirty="0">
+                <a:solidFill>
+                  <a:srgbClr val="FF0000"/>
+                </a:solidFill>
+              </a:rPr>
+              <a:t>*</a:t>
+            </a:r>
+            <a:r>
+              <a:rPr lang="en-GB" sz="1000" dirty="0"/>
+              <a:t> more than one Panel can be created. This example shows 2 panels with 2 stack options</a:t>
+            </a:r>
+          </a:p>
+        </p:txBody>
+      </p:sp>
+      <p:sp>
+        <p:nvSpPr>
+          <p:cNvPr id="71" name="TextBox 70">
+            <a:extLst>
+              <a:ext uri="{FF2B5EF4-FFF2-40B4-BE49-F238E27FC236}">
+                <a16:creationId xmlns:a16="http://schemas.microsoft.com/office/drawing/2014/main" id="{57519985-0AA0-210A-B3AA-998A07387C91}"/>
+              </a:ext>
+            </a:extLst>
+          </p:cNvPr>
+          <p:cNvSpPr txBox="1"/>
+          <p:nvPr/>
+        </p:nvSpPr>
+        <p:spPr>
+          <a:xfrm>
+            <a:off x="7855463" y="3227580"/>
+            <a:ext cx="929439" cy="1015663"/>
+          </a:xfrm>
+          <a:prstGeom prst="rect">
+            <a:avLst/>
+          </a:prstGeom>
+          <a:noFill/>
+        </p:spPr>
+        <p:txBody>
+          <a:bodyPr wrap="square">
+            <a:spAutoFit/>
+          </a:bodyPr>
+          <a:lstStyle/>
+          <a:p>
+            <a:pPr algn="ctr"/>
+            <a:r>
+              <a:rPr lang="en-GB" sz="1000" b="1" dirty="0">
+                <a:solidFill>
+                  <a:srgbClr val="FF0000"/>
+                </a:solidFill>
+              </a:rPr>
+              <a:t>*</a:t>
+            </a:r>
+            <a:r>
+              <a:rPr lang="en-GB" sz="1000" dirty="0"/>
+              <a:t> stack to have at least 2 pushbuttons and maximum of 3 pushbuttons</a:t>
+            </a:r>
+          </a:p>
+        </p:txBody>
+      </p:sp>
+      <p:sp>
+        <p:nvSpPr>
+          <p:cNvPr id="72" name="TextBox 71">
+            <a:extLst>
+              <a:ext uri="{FF2B5EF4-FFF2-40B4-BE49-F238E27FC236}">
+                <a16:creationId xmlns:a16="http://schemas.microsoft.com/office/drawing/2014/main" id="{C1FEF020-107E-3549-E2DD-BE15EFED0F89}"/>
+              </a:ext>
+            </a:extLst>
+          </p:cNvPr>
+          <p:cNvSpPr txBox="1"/>
+          <p:nvPr/>
+        </p:nvSpPr>
+        <p:spPr>
+          <a:xfrm>
+            <a:off x="5763744" y="5280701"/>
+            <a:ext cx="987514" cy="707886"/>
+          </a:xfrm>
+          <a:prstGeom prst="rect">
+            <a:avLst/>
+          </a:prstGeom>
+          <a:noFill/>
+        </p:spPr>
+        <p:txBody>
+          <a:bodyPr wrap="square">
+            <a:spAutoFit/>
+          </a:bodyPr>
+          <a:lstStyle/>
+          <a:p>
+            <a:pPr algn="ctr"/>
+            <a:r>
+              <a:rPr lang="en-GB" sz="1000" b="1" dirty="0">
+                <a:solidFill>
+                  <a:srgbClr val="FF0000"/>
+                </a:solidFill>
+              </a:rPr>
+              <a:t>*</a:t>
+            </a:r>
+            <a:r>
+              <a:rPr lang="en-GB" sz="1000" dirty="0"/>
+              <a:t> pulldown button to have at least one pushbutton</a:t>
             </a:r>
           </a:p>
         </p:txBody>

</xml_diff>